<commit_message>
Weekly meeting slide and picture update
</commit_message>
<xml_diff>
--- a/Documentation/Capstone Documents/Meetings/capstone_meeting_6-3-15.pptx
+++ b/Documentation/Capstone Documents/Meetings/capstone_meeting_6-3-15.pptx
@@ -5313,27 +5313,7 @@
                 <a:latin typeface="Arial"/>
                 <a:ea typeface="MS PGothic"/>
               </a:rPr>
-              <a:t>06/3</a:t>
-            </a:r>
-            <a:r>
-              <a:rPr lang="en-US" i="1" dirty="0" smtClean="0">
-                <a:solidFill>
-                  <a:srgbClr val="FF6600"/>
-                </a:solidFill>
-                <a:latin typeface="Arial"/>
-                <a:ea typeface="MS PGothic"/>
-              </a:rPr>
-              <a:t>/</a:t>
-            </a:r>
-            <a:r>
-              <a:rPr lang="en-US" i="1" dirty="0" smtClean="0">
-                <a:solidFill>
-                  <a:srgbClr val="FF6600"/>
-                </a:solidFill>
-                <a:latin typeface="Arial"/>
-                <a:ea typeface="MS PGothic"/>
-              </a:rPr>
-              <a:t>2015 </a:t>
+              <a:t>06/3/2015 </a:t>
             </a:r>
             <a:endParaRPr dirty="0"/>
           </a:p>
@@ -5654,41 +5634,32 @@
       </p:sp>
       <p:pic>
         <p:nvPicPr>
-          <p:cNvPr id="3074" name="Picture 2" descr="C:\Users\Rishal\Desktop\FullSizeRender.jpg"/>
+          <p:cNvPr id="5" name="Picture 4" descr="demoUnit.JPG"/>
           <p:cNvPicPr>
-            <a:picLocks noChangeAspect="1" noChangeArrowheads="1"/>
+            <a:picLocks noChangeAspect="1"/>
           </p:cNvPicPr>
           <p:nvPr/>
         </p:nvPicPr>
-        <p:blipFill rotWithShape="1">
-          <a:blip r:embed="rId2" cstate="email">
+        <p:blipFill>
+          <a:blip r:embed="rId2">
             <a:extLst>
               <a:ext uri="{28A0092B-C50C-407E-A947-70E740481C1C}">
                 <a14:useLocalDpi xmlns:a14="http://schemas.microsoft.com/office/drawing/2010/main" val="0"/>
               </a:ext>
             </a:extLst>
           </a:blip>
-          <a:srcRect l="17554" r="16893"/>
-          <a:stretch/>
+          <a:stretch>
+            <a:fillRect/>
+          </a:stretch>
         </p:blipFill>
-        <p:spPr bwMode="auto">
-          <a:xfrm>
-            <a:off x="7543800" y="2117006"/>
-            <a:ext cx="3025083" cy="2598459"/>
-          </a:xfrm>
-          <a:prstGeom prst="rect">
-            <a:avLst/>
-          </a:prstGeom>
-          <a:noFill/>
-          <a:extLst>
-            <a:ext uri="{909E8E84-426E-40dd-AFC4-6F175D3DCCD1}">
-              <a14:hiddenFill xmlns:a14="http://schemas.microsoft.com/office/drawing/2010/main">
-                <a:solidFill>
-                  <a:srgbClr val="FFFFFF"/>
-                </a:solidFill>
-              </a14:hiddenFill>
-            </a:ext>
-          </a:extLst>
+        <p:spPr>
+          <a:xfrm>
+            <a:off x="6885000" y="1663402"/>
+            <a:ext cx="4931589" cy="3284438"/>
+          </a:xfrm>
+          <a:prstGeom prst="rect">
+            <a:avLst/>
+          </a:prstGeom>
         </p:spPr>
       </p:pic>
     </p:spTree>
@@ -5814,11 +5785,7 @@
             </a:pPr>
             <a:r>
               <a:rPr lang="en-US" sz="2000" dirty="0" smtClean="0"/>
-              <a:t>Final </a:t>
-            </a:r>
-            <a:r>
-              <a:rPr lang="en-US" sz="2000" dirty="0" smtClean="0"/>
-              <a:t>Code</a:t>
+              <a:t>Final Code</a:t>
             </a:r>
             <a:endParaRPr lang="en-US" dirty="0"/>
           </a:p>
@@ -5859,7 +5826,6 @@
               <a:rPr lang="en-US" sz="2000" dirty="0" smtClean="0"/>
               <a:t>Enclosure completed</a:t>
             </a:r>
-            <a:endParaRPr lang="en-US" sz="2000" dirty="0" smtClean="0"/>
           </a:p>
           <a:p>
             <a:pPr marL="800100" lvl="1" indent="-342900">
@@ -5927,7 +5893,6 @@
               <a:rPr lang="en-US" sz="2000" dirty="0" smtClean="0"/>
               <a:t>Onboard programmer functioning</a:t>
             </a:r>
-            <a:endParaRPr lang="en-US" sz="2000" dirty="0" smtClean="0"/>
           </a:p>
           <a:p>
             <a:pPr marL="1257300" lvl="2" indent="-342900">
@@ -5938,6 +5903,36 @@
           </a:p>
         </p:txBody>
       </p:sp>
+      <p:pic>
+        <p:nvPicPr>
+          <p:cNvPr id="2" name="Picture 1" descr="newEnclosure.JPG"/>
+          <p:cNvPicPr>
+            <a:picLocks noChangeAspect="1"/>
+          </p:cNvPicPr>
+          <p:nvPr/>
+        </p:nvPicPr>
+        <p:blipFill>
+          <a:blip r:embed="rId2">
+            <a:extLst>
+              <a:ext uri="{28A0092B-C50C-407E-A947-70E740481C1C}">
+                <a14:useLocalDpi xmlns:a14="http://schemas.microsoft.com/office/drawing/2010/main" val="0"/>
+              </a:ext>
+            </a:extLst>
+          </a:blip>
+          <a:stretch>
+            <a:fillRect/>
+          </a:stretch>
+        </p:blipFill>
+        <p:spPr>
+          <a:xfrm>
+            <a:off x="6986598" y="1081107"/>
+            <a:ext cx="4493784" cy="2992860"/>
+          </a:xfrm>
+          <a:prstGeom prst="rect">
+            <a:avLst/>
+          </a:prstGeom>
+        </p:spPr>
+      </p:pic>
     </p:spTree>
   </p:cSld>
   <p:clrMapOvr>
@@ -6458,13 +6453,6 @@
               </a:rPr>
               <a:t>Capstone poster session on Friday, June 5th</a:t>
             </a:r>
-            <a:endParaRPr lang="en-US" dirty="0" smtClean="0">
-              <a:solidFill>
-                <a:srgbClr val="000000"/>
-              </a:solidFill>
-              <a:latin typeface="Arial"/>
-              <a:ea typeface="MS PGothic"/>
-            </a:endParaRPr>
           </a:p>
           <a:p>
             <a:pPr lvl="1" algn="dist">

</xml_diff>